<commit_message>
wanted to check on TRANSLATE vs varchar(max). updated slides
</commit_message>
<xml_diff>
--- a/TSQL_Translate_Operator/TSQL Translate.pptx
+++ b/TSQL_Translate_Operator/TSQL Translate.pptx
@@ -2338,7 +2338,7 @@
           <a:p>
             <a:fld id="{D6A2AC56-E20D-4719-9E66-68604E547144}" type="datetimeFigureOut">
               <a:rPr lang="en-US" smtClean="0"/>
-              <a:t>1/25/2024</a:t>
+              <a:t>1/29/2024</a:t>
             </a:fld>
             <a:endParaRPr lang="en-US"/>
           </a:p>
@@ -3688,7 +3688,7 @@
           <a:p>
             <a:fld id="{94E3A28C-D62F-4439-8BFC-9924939B4D00}" type="datetimeFigureOut">
               <a:rPr lang="en-US" smtClean="0"/>
-              <a:t>1/25/2024</a:t>
+              <a:t>1/29/2024</a:t>
             </a:fld>
             <a:endParaRPr lang="en-US"/>
           </a:p>
@@ -3886,7 +3886,7 @@
           <a:p>
             <a:fld id="{94E3A28C-D62F-4439-8BFC-9924939B4D00}" type="datetimeFigureOut">
               <a:rPr lang="en-US" smtClean="0"/>
-              <a:t>1/25/2024</a:t>
+              <a:t>1/29/2024</a:t>
             </a:fld>
             <a:endParaRPr lang="en-US"/>
           </a:p>
@@ -4094,7 +4094,7 @@
           <a:p>
             <a:fld id="{94E3A28C-D62F-4439-8BFC-9924939B4D00}" type="datetimeFigureOut">
               <a:rPr lang="en-US" smtClean="0"/>
-              <a:t>1/25/2024</a:t>
+              <a:t>1/29/2024</a:t>
             </a:fld>
             <a:endParaRPr lang="en-US"/>
           </a:p>
@@ -4292,7 +4292,7 @@
           <a:p>
             <a:fld id="{94E3A28C-D62F-4439-8BFC-9924939B4D00}" type="datetimeFigureOut">
               <a:rPr lang="en-US" smtClean="0"/>
-              <a:t>1/25/2024</a:t>
+              <a:t>1/29/2024</a:t>
             </a:fld>
             <a:endParaRPr lang="en-US"/>
           </a:p>
@@ -4567,7 +4567,7 @@
           <a:p>
             <a:fld id="{94E3A28C-D62F-4439-8BFC-9924939B4D00}" type="datetimeFigureOut">
               <a:rPr lang="en-US" smtClean="0"/>
-              <a:t>1/25/2024</a:t>
+              <a:t>1/29/2024</a:t>
             </a:fld>
             <a:endParaRPr lang="en-US"/>
           </a:p>
@@ -4832,7 +4832,7 @@
           <a:p>
             <a:fld id="{94E3A28C-D62F-4439-8BFC-9924939B4D00}" type="datetimeFigureOut">
               <a:rPr lang="en-US" smtClean="0"/>
-              <a:t>1/25/2024</a:t>
+              <a:t>1/29/2024</a:t>
             </a:fld>
             <a:endParaRPr lang="en-US"/>
           </a:p>
@@ -5244,7 +5244,7 @@
           <a:p>
             <a:fld id="{94E3A28C-D62F-4439-8BFC-9924939B4D00}" type="datetimeFigureOut">
               <a:rPr lang="en-US" smtClean="0"/>
-              <a:t>1/25/2024</a:t>
+              <a:t>1/29/2024</a:t>
             </a:fld>
             <a:endParaRPr lang="en-US"/>
           </a:p>
@@ -5385,7 +5385,7 @@
           <a:p>
             <a:fld id="{94E3A28C-D62F-4439-8BFC-9924939B4D00}" type="datetimeFigureOut">
               <a:rPr lang="en-US" smtClean="0"/>
-              <a:t>1/25/2024</a:t>
+              <a:t>1/29/2024</a:t>
             </a:fld>
             <a:endParaRPr lang="en-US"/>
           </a:p>
@@ -5498,7 +5498,7 @@
           <a:p>
             <a:fld id="{94E3A28C-D62F-4439-8BFC-9924939B4D00}" type="datetimeFigureOut">
               <a:rPr lang="en-US" smtClean="0"/>
-              <a:t>1/25/2024</a:t>
+              <a:t>1/29/2024</a:t>
             </a:fld>
             <a:endParaRPr lang="en-US"/>
           </a:p>
@@ -5809,7 +5809,7 @@
           <a:p>
             <a:fld id="{94E3A28C-D62F-4439-8BFC-9924939B4D00}" type="datetimeFigureOut">
               <a:rPr lang="en-US" smtClean="0"/>
-              <a:t>1/25/2024</a:t>
+              <a:t>1/29/2024</a:t>
             </a:fld>
             <a:endParaRPr lang="en-US"/>
           </a:p>
@@ -6097,7 +6097,7 @@
           <a:p>
             <a:fld id="{94E3A28C-D62F-4439-8BFC-9924939B4D00}" type="datetimeFigureOut">
               <a:rPr lang="en-US" smtClean="0"/>
-              <a:t>1/25/2024</a:t>
+              <a:t>1/29/2024</a:t>
             </a:fld>
             <a:endParaRPr lang="en-US"/>
           </a:p>
@@ -6338,7 +6338,7 @@
           <a:p>
             <a:fld id="{94E3A28C-D62F-4439-8BFC-9924939B4D00}" type="datetimeFigureOut">
               <a:rPr lang="en-US" smtClean="0"/>
-              <a:t>1/25/2024</a:t>
+              <a:t>1/29/2024</a:t>
             </a:fld>
             <a:endParaRPr lang="en-US"/>
           </a:p>
@@ -14323,8 +14323,8 @@
         </p:nvSpPr>
         <p:spPr>
           <a:xfrm>
-            <a:off x="963522" y="1759833"/>
-            <a:ext cx="7106058" cy="3785652"/>
+            <a:off x="963522" y="1577876"/>
+            <a:ext cx="9666378" cy="4401205"/>
           </a:xfrm>
           <a:prstGeom prst="rect">
             <a:avLst/>
@@ -14338,7 +14338,7 @@
           <a:lstStyle/>
           <a:p>
             <a:r>
-              <a:rPr lang="en-US" sz="2400" dirty="0">
+              <a:rPr lang="en-US" sz="2000" dirty="0">
                 <a:solidFill>
                   <a:srgbClr val="0000FF"/>
                 </a:solidFill>
@@ -14347,7 +14347,7 @@
               <a:t>DECLARE</a:t>
             </a:r>
             <a:r>
-              <a:rPr lang="en-US" sz="2400" dirty="0">
+              <a:rPr lang="en-US" sz="2000" dirty="0">
                 <a:solidFill>
                   <a:srgbClr val="000000"/>
                 </a:solidFill>
@@ -14356,7 +14356,7 @@
               <a:t> @_myint </a:t>
             </a:r>
             <a:r>
-              <a:rPr lang="en-US" sz="2400" dirty="0">
+              <a:rPr lang="en-US" sz="2000" dirty="0">
                 <a:solidFill>
                   <a:srgbClr val="0000FF"/>
                 </a:solidFill>
@@ -14365,7 +14365,7 @@
               <a:t>int</a:t>
             </a:r>
             <a:r>
-              <a:rPr lang="en-US" sz="2400" dirty="0">
+              <a:rPr lang="en-US" sz="2000" dirty="0">
                 <a:solidFill>
                   <a:srgbClr val="000000"/>
                 </a:solidFill>
@@ -14374,7 +14374,7 @@
               <a:t> </a:t>
             </a:r>
             <a:r>
-              <a:rPr lang="en-US" sz="2400" dirty="0">
+              <a:rPr lang="en-US" sz="2000" dirty="0">
                 <a:solidFill>
                   <a:srgbClr val="808080"/>
                 </a:solidFill>
@@ -14383,7 +14383,7 @@
               <a:t>=</a:t>
             </a:r>
             <a:r>
-              <a:rPr lang="en-US" sz="2400" dirty="0">
+              <a:rPr lang="en-US" sz="2000" dirty="0">
                 <a:solidFill>
                   <a:srgbClr val="000000"/>
                 </a:solidFill>
@@ -14394,7 +14394,7 @@
           </a:p>
           <a:p>
             <a:r>
-              <a:rPr lang="en-US" sz="2400" dirty="0">
+              <a:rPr lang="en-US" sz="2000" dirty="0">
                 <a:solidFill>
                   <a:srgbClr val="0000FF"/>
                 </a:solidFill>
@@ -14403,7 +14403,7 @@
               <a:t>DECLARE</a:t>
             </a:r>
             <a:r>
-              <a:rPr lang="en-US" sz="2400" dirty="0">
+              <a:rPr lang="en-US" sz="2000" dirty="0">
                 <a:solidFill>
                   <a:srgbClr val="000000"/>
                 </a:solidFill>
@@ -14412,7 +14412,7 @@
               <a:t> @_mytext </a:t>
             </a:r>
             <a:r>
-              <a:rPr lang="en-US" sz="2400" dirty="0">
+              <a:rPr lang="en-US" sz="2000" dirty="0">
                 <a:solidFill>
                   <a:srgbClr val="0000FF"/>
                 </a:solidFill>
@@ -14421,7 +14421,7 @@
               <a:t>varchar</a:t>
             </a:r>
             <a:r>
-              <a:rPr lang="en-US" sz="2400" dirty="0">
+              <a:rPr lang="en-US" sz="2000" dirty="0">
                 <a:solidFill>
                   <a:srgbClr val="808080"/>
                 </a:solidFill>
@@ -14430,7 +14430,7 @@
               <a:t>(</a:t>
             </a:r>
             <a:r>
-              <a:rPr lang="en-US" sz="2400" dirty="0">
+              <a:rPr lang="en-US" sz="2000" dirty="0">
                 <a:solidFill>
                   <a:srgbClr val="000000"/>
                 </a:solidFill>
@@ -14439,16 +14439,16 @@
               <a:t>8</a:t>
             </a:r>
             <a:r>
-              <a:rPr lang="en-US" sz="2400" dirty="0">
-                <a:solidFill>
-                  <a:srgbClr val="808080"/>
-                </a:solidFill>
-                <a:latin typeface="Consolas" panose="020B0609020204030204" pitchFamily="49" charset="0"/>
-              </a:rPr>
-              <a:t>) =</a:t>
-            </a:r>
-            <a:r>
-              <a:rPr lang="en-US" sz="2400" dirty="0">
+              <a:rPr lang="en-US" sz="2000" dirty="0">
+                <a:solidFill>
+                  <a:srgbClr val="808080"/>
+                </a:solidFill>
+                <a:latin typeface="Consolas" panose="020B0609020204030204" pitchFamily="49" charset="0"/>
+              </a:rPr>
+              <a:t>)</a:t>
+            </a:r>
+            <a:r>
+              <a:rPr lang="en-US" sz="2000" dirty="0">
                 <a:solidFill>
                   <a:srgbClr val="000000"/>
                 </a:solidFill>
@@ -14457,7 +14457,25 @@
               <a:t> </a:t>
             </a:r>
             <a:r>
-              <a:rPr lang="en-US" sz="2400" dirty="0">
+              <a:rPr lang="en-US" sz="2000" dirty="0">
+                <a:solidFill>
+                  <a:srgbClr val="808080"/>
+                </a:solidFill>
+                <a:latin typeface="Consolas" panose="020B0609020204030204" pitchFamily="49" charset="0"/>
+              </a:rPr>
+              <a:t>=</a:t>
+            </a:r>
+            <a:r>
+              <a:rPr lang="en-US" sz="2000" dirty="0">
+                <a:solidFill>
+                  <a:srgbClr val="000000"/>
+                </a:solidFill>
+                <a:latin typeface="Consolas" panose="020B0609020204030204" pitchFamily="49" charset="0"/>
+              </a:rPr>
+              <a:t> </a:t>
+            </a:r>
+            <a:r>
+              <a:rPr lang="en-US" sz="2000" dirty="0">
                 <a:solidFill>
                   <a:srgbClr val="FF0000"/>
                 </a:solidFill>
@@ -14465,7 +14483,7 @@
               </a:rPr>
               <a:t>'hello'</a:t>
             </a:r>
-            <a:endParaRPr lang="en-US" sz="2400" dirty="0">
+            <a:endParaRPr lang="en-US" sz="2000" dirty="0">
               <a:solidFill>
                 <a:srgbClr val="000000"/>
               </a:solidFill>
@@ -14473,7 +14491,142 @@
             </a:endParaRPr>
           </a:p>
           <a:p>
-            <a:endParaRPr lang="en-US" sz="2400" dirty="0">
+            <a:r>
+              <a:rPr lang="en-US" sz="2000" dirty="0">
+                <a:solidFill>
+                  <a:srgbClr val="0000FF"/>
+                </a:solidFill>
+                <a:latin typeface="Consolas" panose="020B0609020204030204" pitchFamily="49" charset="0"/>
+              </a:rPr>
+              <a:t>DECLARE</a:t>
+            </a:r>
+            <a:r>
+              <a:rPr lang="en-US" sz="2000" dirty="0">
+                <a:solidFill>
+                  <a:srgbClr val="000000"/>
+                </a:solidFill>
+                <a:latin typeface="Consolas" panose="020B0609020204030204" pitchFamily="49" charset="0"/>
+              </a:rPr>
+              <a:t> @_mybigtext </a:t>
+            </a:r>
+            <a:r>
+              <a:rPr lang="en-US" sz="2000" dirty="0">
+                <a:solidFill>
+                  <a:srgbClr val="0000FF"/>
+                </a:solidFill>
+                <a:latin typeface="Consolas" panose="020B0609020204030204" pitchFamily="49" charset="0"/>
+              </a:rPr>
+              <a:t>varchar</a:t>
+            </a:r>
+            <a:r>
+              <a:rPr lang="en-US" sz="2000" dirty="0">
+                <a:solidFill>
+                  <a:srgbClr val="808080"/>
+                </a:solidFill>
+                <a:latin typeface="Consolas" panose="020B0609020204030204" pitchFamily="49" charset="0"/>
+              </a:rPr>
+              <a:t>(</a:t>
+            </a:r>
+            <a:r>
+              <a:rPr lang="en-US" sz="2000" dirty="0">
+                <a:solidFill>
+                  <a:srgbClr val="FF00FF"/>
+                </a:solidFill>
+                <a:latin typeface="Consolas" panose="020B0609020204030204" pitchFamily="49" charset="0"/>
+              </a:rPr>
+              <a:t>max</a:t>
+            </a:r>
+            <a:r>
+              <a:rPr lang="en-US" sz="2000" dirty="0">
+                <a:solidFill>
+                  <a:srgbClr val="808080"/>
+                </a:solidFill>
+                <a:latin typeface="Consolas" panose="020B0609020204030204" pitchFamily="49" charset="0"/>
+              </a:rPr>
+              <a:t>)</a:t>
+            </a:r>
+            <a:r>
+              <a:rPr lang="en-US" sz="2000" dirty="0">
+                <a:solidFill>
+                  <a:srgbClr val="000000"/>
+                </a:solidFill>
+                <a:latin typeface="Consolas" panose="020B0609020204030204" pitchFamily="49" charset="0"/>
+              </a:rPr>
+              <a:t> </a:t>
+            </a:r>
+            <a:r>
+              <a:rPr lang="en-US" sz="2000" dirty="0">
+                <a:solidFill>
+                  <a:srgbClr val="808080"/>
+                </a:solidFill>
+                <a:latin typeface="Consolas" panose="020B0609020204030204" pitchFamily="49" charset="0"/>
+              </a:rPr>
+              <a:t>=</a:t>
+            </a:r>
+            <a:r>
+              <a:rPr lang="en-US" sz="2000" dirty="0">
+                <a:solidFill>
+                  <a:srgbClr val="000000"/>
+                </a:solidFill>
+                <a:latin typeface="Consolas" panose="020B0609020204030204" pitchFamily="49" charset="0"/>
+              </a:rPr>
+              <a:t> </a:t>
+            </a:r>
+            <a:r>
+              <a:rPr lang="en-US" sz="2000" dirty="0">
+                <a:solidFill>
+                  <a:srgbClr val="FF00FF"/>
+                </a:solidFill>
+                <a:latin typeface="Consolas" panose="020B0609020204030204" pitchFamily="49" charset="0"/>
+              </a:rPr>
+              <a:t>REPLICATE</a:t>
+            </a:r>
+            <a:r>
+              <a:rPr lang="en-US" sz="2000" dirty="0">
+                <a:solidFill>
+                  <a:srgbClr val="808080"/>
+                </a:solidFill>
+                <a:latin typeface="Consolas" panose="020B0609020204030204" pitchFamily="49" charset="0"/>
+              </a:rPr>
+              <a:t>(</a:t>
+            </a:r>
+            <a:r>
+              <a:rPr lang="en-US" sz="2000" dirty="0">
+                <a:solidFill>
+                  <a:srgbClr val="FF0000"/>
+                </a:solidFill>
+                <a:latin typeface="Consolas" panose="020B0609020204030204" pitchFamily="49" charset="0"/>
+              </a:rPr>
+              <a:t>'hello '</a:t>
+            </a:r>
+            <a:r>
+              <a:rPr lang="en-US" sz="2000" dirty="0">
+                <a:solidFill>
+                  <a:srgbClr val="808080"/>
+                </a:solidFill>
+                <a:latin typeface="Consolas" panose="020B0609020204030204" pitchFamily="49" charset="0"/>
+              </a:rPr>
+              <a:t>,</a:t>
+            </a:r>
+            <a:r>
+              <a:rPr lang="en-US" sz="2000" dirty="0">
+                <a:solidFill>
+                  <a:srgbClr val="000000"/>
+                </a:solidFill>
+                <a:latin typeface="Consolas" panose="020B0609020204030204" pitchFamily="49" charset="0"/>
+              </a:rPr>
+              <a:t> 2000</a:t>
+            </a:r>
+            <a:r>
+              <a:rPr lang="en-US" sz="2000" dirty="0">
+                <a:solidFill>
+                  <a:srgbClr val="808080"/>
+                </a:solidFill>
+                <a:latin typeface="Consolas" panose="020B0609020204030204" pitchFamily="49" charset="0"/>
+              </a:rPr>
+              <a:t>)</a:t>
+            </a:r>
+            <a:endParaRPr lang="en-US" sz="2000" dirty="0">
               <a:solidFill>
                 <a:srgbClr val="000000"/>
               </a:solidFill>
@@ -14481,52 +14634,7 @@
             </a:endParaRPr>
           </a:p>
           <a:p>
-            <a:r>
-              <a:rPr lang="en-US" sz="2400" dirty="0">
-                <a:solidFill>
-                  <a:srgbClr val="0000FF"/>
-                </a:solidFill>
-                <a:latin typeface="Consolas" panose="020B0609020204030204" pitchFamily="49" charset="0"/>
-              </a:rPr>
-              <a:t>SELECT</a:t>
-            </a:r>
-            <a:r>
-              <a:rPr lang="en-US" sz="2400" dirty="0">
-                <a:solidFill>
-                  <a:srgbClr val="000000"/>
-                </a:solidFill>
-                <a:latin typeface="Consolas" panose="020B0609020204030204" pitchFamily="49" charset="0"/>
-              </a:rPr>
-              <a:t> @_myint </a:t>
-            </a:r>
-            <a:r>
-              <a:rPr lang="en-US" sz="2400" dirty="0">
-                <a:solidFill>
-                  <a:srgbClr val="0000FF"/>
-                </a:solidFill>
-                <a:latin typeface="Consolas" panose="020B0609020204030204" pitchFamily="49" charset="0"/>
-              </a:rPr>
-              <a:t>AS</a:t>
-            </a:r>
-            <a:r>
-              <a:rPr lang="en-US" sz="2400" dirty="0">
-                <a:solidFill>
-                  <a:srgbClr val="000000"/>
-                </a:solidFill>
-                <a:latin typeface="Consolas" panose="020B0609020204030204" pitchFamily="49" charset="0"/>
-              </a:rPr>
-              <a:t> </a:t>
-            </a:r>
-            <a:r>
-              <a:rPr lang="en-US" sz="2400" dirty="0" err="1">
-                <a:solidFill>
-                  <a:srgbClr val="000000"/>
-                </a:solidFill>
-                <a:latin typeface="Consolas" panose="020B0609020204030204" pitchFamily="49" charset="0"/>
-              </a:rPr>
-              <a:t>MyInt</a:t>
-            </a:r>
-            <a:endParaRPr lang="en-US" sz="2400" dirty="0">
+            <a:endParaRPr lang="en-US" sz="2000" dirty="0">
               <a:solidFill>
                 <a:srgbClr val="000000"/>
               </a:solidFill>
@@ -14535,16 +14643,34 @@
           </a:p>
           <a:p>
             <a:r>
-              <a:rPr lang="en-US" sz="2400" dirty="0">
-                <a:solidFill>
-                  <a:srgbClr val="808080"/>
-                </a:solidFill>
-                <a:latin typeface="Consolas" panose="020B0609020204030204" pitchFamily="49" charset="0"/>
-              </a:rPr>
-              <a:t>  ,</a:t>
-            </a:r>
-            <a:r>
-              <a:rPr lang="en-US" sz="2400" dirty="0">
+              <a:rPr lang="en-US" sz="2000" dirty="0">
+                <a:solidFill>
+                  <a:srgbClr val="0000FF"/>
+                </a:solidFill>
+                <a:latin typeface="Consolas" panose="020B0609020204030204" pitchFamily="49" charset="0"/>
+              </a:rPr>
+              <a:t>SELECT</a:t>
+            </a:r>
+            <a:r>
+              <a:rPr lang="en-US" sz="2000" dirty="0">
+                <a:solidFill>
+                  <a:srgbClr val="000000"/>
+                </a:solidFill>
+                <a:latin typeface="Consolas" panose="020B0609020204030204" pitchFamily="49" charset="0"/>
+              </a:rPr>
+              <a:t> @_myint </a:t>
+            </a:r>
+            <a:r>
+              <a:rPr lang="en-US" sz="2000" dirty="0">
+                <a:solidFill>
+                  <a:srgbClr val="0000FF"/>
+                </a:solidFill>
+                <a:latin typeface="Consolas" panose="020B0609020204030204" pitchFamily="49" charset="0"/>
+              </a:rPr>
+              <a:t>AS</a:t>
+            </a:r>
+            <a:r>
+              <a:rPr lang="en-US" sz="2000" dirty="0">
                 <a:solidFill>
                   <a:srgbClr val="000000"/>
                 </a:solidFill>
@@ -14553,143 +14679,15 @@
               <a:t> </a:t>
             </a:r>
             <a:r>
-              <a:rPr lang="en-US" sz="2400" dirty="0">
-                <a:solidFill>
-                  <a:srgbClr val="FF00FF"/>
-                </a:solidFill>
-                <a:latin typeface="Consolas" panose="020B0609020204030204" pitchFamily="49" charset="0"/>
-              </a:rPr>
-              <a:t>TRANSLATE</a:t>
-            </a:r>
-            <a:r>
-              <a:rPr lang="en-US" sz="2400" dirty="0">
-                <a:solidFill>
-                  <a:srgbClr val="808080"/>
-                </a:solidFill>
-                <a:latin typeface="Consolas" panose="020B0609020204030204" pitchFamily="49" charset="0"/>
-              </a:rPr>
-              <a:t>(</a:t>
-            </a:r>
-            <a:r>
-              <a:rPr lang="en-US" sz="2400" dirty="0">
-                <a:solidFill>
-                  <a:srgbClr val="000000"/>
-                </a:solidFill>
-                <a:latin typeface="Consolas" panose="020B0609020204030204" pitchFamily="49" charset="0"/>
-              </a:rPr>
-              <a:t>@_myint</a:t>
-            </a:r>
-            <a:r>
-              <a:rPr lang="en-US" sz="2400" dirty="0">
-                <a:solidFill>
-                  <a:srgbClr val="808080"/>
-                </a:solidFill>
-                <a:latin typeface="Consolas" panose="020B0609020204030204" pitchFamily="49" charset="0"/>
-              </a:rPr>
-              <a:t>,</a:t>
-            </a:r>
-            <a:r>
-              <a:rPr lang="en-US" sz="2400" dirty="0">
-                <a:solidFill>
-                  <a:srgbClr val="000000"/>
-                </a:solidFill>
-                <a:latin typeface="Consolas" panose="020B0609020204030204" pitchFamily="49" charset="0"/>
-              </a:rPr>
-              <a:t> </a:t>
-            </a:r>
-            <a:r>
-              <a:rPr lang="en-US" sz="2400" dirty="0">
-                <a:solidFill>
-                  <a:srgbClr val="FF0000"/>
-                </a:solidFill>
-                <a:latin typeface="Consolas" panose="020B0609020204030204" pitchFamily="49" charset="0"/>
-              </a:rPr>
-              <a:t>'3'</a:t>
-            </a:r>
-            <a:r>
-              <a:rPr lang="en-US" sz="2400" dirty="0">
-                <a:solidFill>
-                  <a:srgbClr val="808080"/>
-                </a:solidFill>
-                <a:latin typeface="Consolas" panose="020B0609020204030204" pitchFamily="49" charset="0"/>
-              </a:rPr>
-              <a:t>,</a:t>
-            </a:r>
-            <a:r>
-              <a:rPr lang="en-US" sz="2400" dirty="0">
-                <a:solidFill>
-                  <a:srgbClr val="000000"/>
-                </a:solidFill>
-                <a:latin typeface="Consolas" panose="020B0609020204030204" pitchFamily="49" charset="0"/>
-              </a:rPr>
-              <a:t> </a:t>
-            </a:r>
-            <a:r>
-              <a:rPr lang="en-US" sz="2400" dirty="0">
-                <a:solidFill>
-                  <a:srgbClr val="FF0000"/>
-                </a:solidFill>
-                <a:latin typeface="Consolas" panose="020B0609020204030204" pitchFamily="49" charset="0"/>
-              </a:rPr>
-              <a:t>'6'</a:t>
-            </a:r>
-            <a:r>
-              <a:rPr lang="en-US" sz="2400" dirty="0">
-                <a:solidFill>
-                  <a:srgbClr val="808080"/>
-                </a:solidFill>
-                <a:latin typeface="Consolas" panose="020B0609020204030204" pitchFamily="49" charset="0"/>
-              </a:rPr>
-              <a:t>)</a:t>
-            </a:r>
-            <a:r>
-              <a:rPr lang="en-US" sz="2400" dirty="0">
-                <a:solidFill>
-                  <a:srgbClr val="000000"/>
-                </a:solidFill>
-                <a:latin typeface="Consolas" panose="020B0609020204030204" pitchFamily="49" charset="0"/>
-              </a:rPr>
-              <a:t> </a:t>
-            </a:r>
-          </a:p>
-          <a:p>
-            <a:r>
-              <a:rPr lang="en-US" sz="2400" dirty="0">
-                <a:solidFill>
-                  <a:srgbClr val="000000"/>
-                </a:solidFill>
-                <a:latin typeface="Consolas" panose="020B0609020204030204" pitchFamily="49" charset="0"/>
-              </a:rPr>
-              <a:t>       </a:t>
-            </a:r>
-            <a:r>
-              <a:rPr lang="en-US" sz="2400" dirty="0">
-                <a:solidFill>
-                  <a:srgbClr val="0000FF"/>
-                </a:solidFill>
-                <a:latin typeface="Consolas" panose="020B0609020204030204" pitchFamily="49" charset="0"/>
-              </a:rPr>
-              <a:t>AS</a:t>
-            </a:r>
-            <a:r>
-              <a:rPr lang="en-US" sz="2400" dirty="0">
-                <a:solidFill>
-                  <a:srgbClr val="000000"/>
-                </a:solidFill>
-                <a:latin typeface="Consolas" panose="020B0609020204030204" pitchFamily="49" charset="0"/>
-              </a:rPr>
-              <a:t> </a:t>
-            </a:r>
-            <a:r>
-              <a:rPr lang="en-US" sz="2400" dirty="0" err="1">
-                <a:solidFill>
-                  <a:srgbClr val="000000"/>
-                </a:solidFill>
-                <a:latin typeface="Consolas" panose="020B0609020204030204" pitchFamily="49" charset="0"/>
-              </a:rPr>
-              <a:t>MyNewInt</a:t>
-            </a:r>
-            <a:endParaRPr lang="en-US" sz="2400" dirty="0">
+              <a:rPr lang="en-US" sz="2000" dirty="0" err="1">
+                <a:solidFill>
+                  <a:srgbClr val="000000"/>
+                </a:solidFill>
+                <a:latin typeface="Consolas" panose="020B0609020204030204" pitchFamily="49" charset="0"/>
+              </a:rPr>
+              <a:t>MyInt</a:t>
+            </a:r>
+            <a:endParaRPr lang="en-US" sz="2000" dirty="0">
               <a:solidFill>
                 <a:srgbClr val="000000"/>
               </a:solidFill>
@@ -14698,25 +14696,144 @@
           </a:p>
           <a:p>
             <a:r>
-              <a:rPr lang="en-US" sz="2400" dirty="0">
-                <a:solidFill>
-                  <a:srgbClr val="808080"/>
-                </a:solidFill>
-                <a:latin typeface="Consolas" panose="020B0609020204030204" pitchFamily="49" charset="0"/>
-              </a:rPr>
-              <a:t>  ,</a:t>
-            </a:r>
-            <a:r>
-              <a:rPr lang="en-US" sz="2400" dirty="0">
-                <a:solidFill>
-                  <a:srgbClr val="000000"/>
-                </a:solidFill>
-                <a:latin typeface="Consolas" panose="020B0609020204030204" pitchFamily="49" charset="0"/>
-              </a:rPr>
-              <a:t> @_mytext </a:t>
-            </a:r>
-            <a:r>
-              <a:rPr lang="en-US" sz="2400" dirty="0">
+              <a:rPr lang="en-US" sz="2000" dirty="0">
+                <a:solidFill>
+                  <a:srgbClr val="000000"/>
+                </a:solidFill>
+                <a:latin typeface="Consolas" panose="020B0609020204030204" pitchFamily="49" charset="0"/>
+              </a:rPr>
+              <a:t>  </a:t>
+            </a:r>
+            <a:r>
+              <a:rPr lang="en-US" sz="2000" dirty="0">
+                <a:solidFill>
+                  <a:srgbClr val="808080"/>
+                </a:solidFill>
+                <a:latin typeface="Consolas" panose="020B0609020204030204" pitchFamily="49" charset="0"/>
+              </a:rPr>
+              <a:t>,</a:t>
+            </a:r>
+            <a:r>
+              <a:rPr lang="en-US" sz="2000" dirty="0">
+                <a:solidFill>
+                  <a:srgbClr val="000000"/>
+                </a:solidFill>
+                <a:latin typeface="Consolas" panose="020B0609020204030204" pitchFamily="49" charset="0"/>
+              </a:rPr>
+              <a:t> </a:t>
+            </a:r>
+            <a:r>
+              <a:rPr lang="en-US" sz="2000" dirty="0">
+                <a:solidFill>
+                  <a:srgbClr val="FF00FF"/>
+                </a:solidFill>
+                <a:latin typeface="Consolas" panose="020B0609020204030204" pitchFamily="49" charset="0"/>
+              </a:rPr>
+              <a:t>TRANSLATE</a:t>
+            </a:r>
+            <a:r>
+              <a:rPr lang="en-US" sz="2000" dirty="0">
+                <a:solidFill>
+                  <a:srgbClr val="808080"/>
+                </a:solidFill>
+                <a:latin typeface="Consolas" panose="020B0609020204030204" pitchFamily="49" charset="0"/>
+              </a:rPr>
+              <a:t>(</a:t>
+            </a:r>
+            <a:r>
+              <a:rPr lang="en-US" sz="2000" dirty="0">
+                <a:solidFill>
+                  <a:srgbClr val="000000"/>
+                </a:solidFill>
+                <a:latin typeface="Consolas" panose="020B0609020204030204" pitchFamily="49" charset="0"/>
+              </a:rPr>
+              <a:t>@_myint</a:t>
+            </a:r>
+            <a:r>
+              <a:rPr lang="en-US" sz="2000" dirty="0">
+                <a:solidFill>
+                  <a:srgbClr val="808080"/>
+                </a:solidFill>
+                <a:latin typeface="Consolas" panose="020B0609020204030204" pitchFamily="49" charset="0"/>
+              </a:rPr>
+              <a:t>,</a:t>
+            </a:r>
+            <a:r>
+              <a:rPr lang="en-US" sz="2000" dirty="0">
+                <a:solidFill>
+                  <a:srgbClr val="000000"/>
+                </a:solidFill>
+                <a:latin typeface="Consolas" panose="020B0609020204030204" pitchFamily="49" charset="0"/>
+              </a:rPr>
+              <a:t> </a:t>
+            </a:r>
+            <a:r>
+              <a:rPr lang="en-US" sz="2000" dirty="0">
+                <a:solidFill>
+                  <a:srgbClr val="FF0000"/>
+                </a:solidFill>
+                <a:latin typeface="Consolas" panose="020B0609020204030204" pitchFamily="49" charset="0"/>
+              </a:rPr>
+              <a:t>'3'</a:t>
+            </a:r>
+            <a:r>
+              <a:rPr lang="en-US" sz="2000" dirty="0">
+                <a:solidFill>
+                  <a:srgbClr val="808080"/>
+                </a:solidFill>
+                <a:latin typeface="Consolas" panose="020B0609020204030204" pitchFamily="49" charset="0"/>
+              </a:rPr>
+              <a:t>,</a:t>
+            </a:r>
+            <a:r>
+              <a:rPr lang="en-US" sz="2000" dirty="0">
+                <a:solidFill>
+                  <a:srgbClr val="000000"/>
+                </a:solidFill>
+                <a:latin typeface="Consolas" panose="020B0609020204030204" pitchFamily="49" charset="0"/>
+              </a:rPr>
+              <a:t> </a:t>
+            </a:r>
+            <a:r>
+              <a:rPr lang="en-US" sz="2000" dirty="0">
+                <a:solidFill>
+                  <a:srgbClr val="FF0000"/>
+                </a:solidFill>
+                <a:latin typeface="Consolas" panose="020B0609020204030204" pitchFamily="49" charset="0"/>
+              </a:rPr>
+              <a:t>'6'</a:t>
+            </a:r>
+            <a:r>
+              <a:rPr lang="en-US" sz="2000" dirty="0">
+                <a:solidFill>
+                  <a:srgbClr val="808080"/>
+                </a:solidFill>
+                <a:latin typeface="Consolas" panose="020B0609020204030204" pitchFamily="49" charset="0"/>
+              </a:rPr>
+              <a:t>)</a:t>
+            </a:r>
+            <a:r>
+              <a:rPr lang="en-US" sz="2000" dirty="0">
+                <a:solidFill>
+                  <a:srgbClr val="000000"/>
+                </a:solidFill>
+                <a:latin typeface="Consolas" panose="020B0609020204030204" pitchFamily="49" charset="0"/>
+              </a:rPr>
+              <a:t> </a:t>
+            </a:r>
+          </a:p>
+          <a:p>
+            <a:r>
+              <a:rPr lang="en-US" sz="2000" dirty="0">
+                <a:solidFill>
+                  <a:srgbClr val="000000"/>
+                </a:solidFill>
+                <a:latin typeface="Consolas" panose="020B0609020204030204" pitchFamily="49" charset="0"/>
+              </a:rPr>
+              <a:t>       </a:t>
+            </a:r>
+            <a:r>
+              <a:rPr lang="en-US" sz="2000" dirty="0">
                 <a:solidFill>
                   <a:srgbClr val="0000FF"/>
                 </a:solidFill>
@@ -14725,7 +14842,7 @@
               <a:t>AS</a:t>
             </a:r>
             <a:r>
-              <a:rPr lang="en-US" sz="2400" dirty="0">
+              <a:rPr lang="en-US" sz="2000" dirty="0">
                 <a:solidFill>
                   <a:srgbClr val="000000"/>
                 </a:solidFill>
@@ -14734,15 +14851,15 @@
               <a:t> </a:t>
             </a:r>
             <a:r>
-              <a:rPr lang="en-US" sz="2400" dirty="0" err="1">
-                <a:solidFill>
-                  <a:srgbClr val="000000"/>
-                </a:solidFill>
-                <a:latin typeface="Consolas" panose="020B0609020204030204" pitchFamily="49" charset="0"/>
-              </a:rPr>
-              <a:t>MyText</a:t>
-            </a:r>
-            <a:endParaRPr lang="en-US" sz="2400" dirty="0">
+              <a:rPr lang="en-US" sz="2000" dirty="0" err="1">
+                <a:solidFill>
+                  <a:srgbClr val="000000"/>
+                </a:solidFill>
+                <a:latin typeface="Consolas" panose="020B0609020204030204" pitchFamily="49" charset="0"/>
+              </a:rPr>
+              <a:t>MyNewInt</a:t>
+            </a:r>
+            <a:endParaRPr lang="en-US" sz="2000" dirty="0">
               <a:solidFill>
                 <a:srgbClr val="000000"/>
               </a:solidFill>
@@ -14751,16 +14868,43 @@
           </a:p>
           <a:p>
             <a:r>
-              <a:rPr lang="en-US" sz="2400" dirty="0">
-                <a:solidFill>
-                  <a:srgbClr val="808080"/>
-                </a:solidFill>
-                <a:latin typeface="Consolas" panose="020B0609020204030204" pitchFamily="49" charset="0"/>
-              </a:rPr>
-              <a:t>  ,</a:t>
-            </a:r>
-            <a:r>
-              <a:rPr lang="en-US" sz="2400" dirty="0">
+              <a:rPr lang="en-US" sz="2000" dirty="0">
+                <a:solidFill>
+                  <a:srgbClr val="000000"/>
+                </a:solidFill>
+                <a:latin typeface="Consolas" panose="020B0609020204030204" pitchFamily="49" charset="0"/>
+              </a:rPr>
+              <a:t>  </a:t>
+            </a:r>
+            <a:r>
+              <a:rPr lang="en-US" sz="2000" dirty="0">
+                <a:solidFill>
+                  <a:srgbClr val="808080"/>
+                </a:solidFill>
+                <a:latin typeface="Consolas" panose="020B0609020204030204" pitchFamily="49" charset="0"/>
+              </a:rPr>
+              <a:t>,</a:t>
+            </a:r>
+            <a:r>
+              <a:rPr lang="en-US" sz="2000" dirty="0">
+                <a:solidFill>
+                  <a:srgbClr val="000000"/>
+                </a:solidFill>
+                <a:latin typeface="Consolas" panose="020B0609020204030204" pitchFamily="49" charset="0"/>
+              </a:rPr>
+              <a:t> @_mytext </a:t>
+            </a:r>
+            <a:r>
+              <a:rPr lang="en-US" sz="2000" dirty="0">
+                <a:solidFill>
+                  <a:srgbClr val="0000FF"/>
+                </a:solidFill>
+                <a:latin typeface="Consolas" panose="020B0609020204030204" pitchFamily="49" charset="0"/>
+              </a:rPr>
+              <a:t>AS</a:t>
+            </a:r>
+            <a:r>
+              <a:rPr lang="en-US" sz="2000" dirty="0">
                 <a:solidFill>
                   <a:srgbClr val="000000"/>
                 </a:solidFill>
@@ -14769,143 +14913,15 @@
               <a:t> </a:t>
             </a:r>
             <a:r>
-              <a:rPr lang="en-US" sz="2400" dirty="0">
-                <a:solidFill>
-                  <a:srgbClr val="FF00FF"/>
-                </a:solidFill>
-                <a:latin typeface="Consolas" panose="020B0609020204030204" pitchFamily="49" charset="0"/>
-              </a:rPr>
-              <a:t>TRANSLATE</a:t>
-            </a:r>
-            <a:r>
-              <a:rPr lang="en-US" sz="2400" dirty="0">
-                <a:solidFill>
-                  <a:srgbClr val="808080"/>
-                </a:solidFill>
-                <a:latin typeface="Consolas" panose="020B0609020204030204" pitchFamily="49" charset="0"/>
-              </a:rPr>
-              <a:t>(</a:t>
-            </a:r>
-            <a:r>
-              <a:rPr lang="en-US" sz="2400" dirty="0">
-                <a:solidFill>
-                  <a:srgbClr val="000000"/>
-                </a:solidFill>
-                <a:latin typeface="Consolas" panose="020B0609020204030204" pitchFamily="49" charset="0"/>
-              </a:rPr>
-              <a:t>@_mytext</a:t>
-            </a:r>
-            <a:r>
-              <a:rPr lang="en-US" sz="2400" dirty="0">
-                <a:solidFill>
-                  <a:srgbClr val="808080"/>
-                </a:solidFill>
-                <a:latin typeface="Consolas" panose="020B0609020204030204" pitchFamily="49" charset="0"/>
-              </a:rPr>
-              <a:t>,</a:t>
-            </a:r>
-            <a:r>
-              <a:rPr lang="en-US" sz="2400" dirty="0">
-                <a:solidFill>
-                  <a:srgbClr val="000000"/>
-                </a:solidFill>
-                <a:latin typeface="Consolas" panose="020B0609020204030204" pitchFamily="49" charset="0"/>
-              </a:rPr>
-              <a:t> </a:t>
-            </a:r>
-            <a:r>
-              <a:rPr lang="en-US" sz="2400" dirty="0">
-                <a:solidFill>
-                  <a:srgbClr val="FF0000"/>
-                </a:solidFill>
-                <a:latin typeface="Consolas" panose="020B0609020204030204" pitchFamily="49" charset="0"/>
-              </a:rPr>
-              <a:t>'E'</a:t>
-            </a:r>
-            <a:r>
-              <a:rPr lang="en-US" sz="2400" dirty="0">
-                <a:solidFill>
-                  <a:srgbClr val="808080"/>
-                </a:solidFill>
-                <a:latin typeface="Consolas" panose="020B0609020204030204" pitchFamily="49" charset="0"/>
-              </a:rPr>
-              <a:t>,</a:t>
-            </a:r>
-            <a:r>
-              <a:rPr lang="en-US" sz="2400" dirty="0">
-                <a:solidFill>
-                  <a:srgbClr val="000000"/>
-                </a:solidFill>
-                <a:latin typeface="Consolas" panose="020B0609020204030204" pitchFamily="49" charset="0"/>
-              </a:rPr>
-              <a:t> </a:t>
-            </a:r>
-            <a:r>
-              <a:rPr lang="en-US" sz="2400" dirty="0">
-                <a:solidFill>
-                  <a:srgbClr val="FF0000"/>
-                </a:solidFill>
-                <a:latin typeface="Consolas" panose="020B0609020204030204" pitchFamily="49" charset="0"/>
-              </a:rPr>
-              <a:t>'A'</a:t>
-            </a:r>
-            <a:r>
-              <a:rPr lang="en-US" sz="2400" dirty="0">
-                <a:solidFill>
-                  <a:srgbClr val="808080"/>
-                </a:solidFill>
-                <a:latin typeface="Consolas" panose="020B0609020204030204" pitchFamily="49" charset="0"/>
-              </a:rPr>
-              <a:t>)</a:t>
-            </a:r>
-            <a:r>
-              <a:rPr lang="en-US" sz="2400" dirty="0">
-                <a:solidFill>
-                  <a:srgbClr val="000000"/>
-                </a:solidFill>
-                <a:latin typeface="Consolas" panose="020B0609020204030204" pitchFamily="49" charset="0"/>
-              </a:rPr>
-              <a:t> </a:t>
-            </a:r>
-          </a:p>
-          <a:p>
-            <a:r>
-              <a:rPr lang="en-US" sz="2400" dirty="0">
-                <a:solidFill>
-                  <a:srgbClr val="000000"/>
-                </a:solidFill>
-                <a:latin typeface="Consolas" panose="020B0609020204030204" pitchFamily="49" charset="0"/>
-              </a:rPr>
-              <a:t>       </a:t>
-            </a:r>
-            <a:r>
-              <a:rPr lang="en-US" sz="2400" dirty="0">
-                <a:solidFill>
-                  <a:srgbClr val="0000FF"/>
-                </a:solidFill>
-                <a:latin typeface="Consolas" panose="020B0609020204030204" pitchFamily="49" charset="0"/>
-              </a:rPr>
-              <a:t>AS</a:t>
-            </a:r>
-            <a:r>
-              <a:rPr lang="en-US" sz="2400" dirty="0">
-                <a:solidFill>
-                  <a:srgbClr val="000000"/>
-                </a:solidFill>
-                <a:latin typeface="Consolas" panose="020B0609020204030204" pitchFamily="49" charset="0"/>
-              </a:rPr>
-              <a:t> </a:t>
-            </a:r>
-            <a:r>
-              <a:rPr lang="en-US" sz="2400" dirty="0" err="1">
-                <a:solidFill>
-                  <a:srgbClr val="000000"/>
-                </a:solidFill>
-                <a:latin typeface="Consolas" panose="020B0609020204030204" pitchFamily="49" charset="0"/>
-              </a:rPr>
-              <a:t>MyNewText</a:t>
-            </a:r>
-            <a:endParaRPr lang="en-US" sz="2400" dirty="0">
+              <a:rPr lang="en-US" sz="2000" dirty="0" err="1">
+                <a:solidFill>
+                  <a:srgbClr val="000000"/>
+                </a:solidFill>
+                <a:latin typeface="Consolas" panose="020B0609020204030204" pitchFamily="49" charset="0"/>
+              </a:rPr>
+              <a:t>MyText</a:t>
+            </a:r>
+            <a:endParaRPr lang="en-US" sz="2000" dirty="0">
               <a:solidFill>
                 <a:srgbClr val="000000"/>
               </a:solidFill>
@@ -14914,16 +14930,422 @@
           </a:p>
           <a:p>
             <a:r>
-              <a:rPr lang="en-US" sz="2400" dirty="0">
+              <a:rPr lang="en-US" sz="2000" dirty="0">
+                <a:solidFill>
+                  <a:srgbClr val="000000"/>
+                </a:solidFill>
+                <a:latin typeface="Consolas" panose="020B0609020204030204" pitchFamily="49" charset="0"/>
+              </a:rPr>
+              <a:t>  </a:t>
+            </a:r>
+            <a:r>
+              <a:rPr lang="en-US" sz="2000" dirty="0">
+                <a:solidFill>
+                  <a:srgbClr val="808080"/>
+                </a:solidFill>
+                <a:latin typeface="Consolas" panose="020B0609020204030204" pitchFamily="49" charset="0"/>
+              </a:rPr>
+              <a:t>,</a:t>
+            </a:r>
+            <a:r>
+              <a:rPr lang="en-US" sz="2000" dirty="0">
+                <a:solidFill>
+                  <a:srgbClr val="000000"/>
+                </a:solidFill>
+                <a:latin typeface="Consolas" panose="020B0609020204030204" pitchFamily="49" charset="0"/>
+              </a:rPr>
+              <a:t> </a:t>
+            </a:r>
+            <a:r>
+              <a:rPr lang="en-US" sz="2000" dirty="0">
+                <a:solidFill>
+                  <a:srgbClr val="FF00FF"/>
+                </a:solidFill>
+                <a:latin typeface="Consolas" panose="020B0609020204030204" pitchFamily="49" charset="0"/>
+              </a:rPr>
+              <a:t>TRANSLATE</a:t>
+            </a:r>
+            <a:r>
+              <a:rPr lang="en-US" sz="2000" dirty="0">
+                <a:solidFill>
+                  <a:srgbClr val="808080"/>
+                </a:solidFill>
+                <a:latin typeface="Consolas" panose="020B0609020204030204" pitchFamily="49" charset="0"/>
+              </a:rPr>
+              <a:t>(</a:t>
+            </a:r>
+            <a:r>
+              <a:rPr lang="en-US" sz="2000" dirty="0">
+                <a:solidFill>
+                  <a:srgbClr val="000000"/>
+                </a:solidFill>
+                <a:latin typeface="Consolas" panose="020B0609020204030204" pitchFamily="49" charset="0"/>
+              </a:rPr>
+              <a:t>@_mytext</a:t>
+            </a:r>
+            <a:r>
+              <a:rPr lang="en-US" sz="2000" dirty="0">
+                <a:solidFill>
+                  <a:srgbClr val="808080"/>
+                </a:solidFill>
+                <a:latin typeface="Consolas" panose="020B0609020204030204" pitchFamily="49" charset="0"/>
+              </a:rPr>
+              <a:t>,</a:t>
+            </a:r>
+            <a:r>
+              <a:rPr lang="en-US" sz="2000" dirty="0">
+                <a:solidFill>
+                  <a:srgbClr val="000000"/>
+                </a:solidFill>
+                <a:latin typeface="Consolas" panose="020B0609020204030204" pitchFamily="49" charset="0"/>
+              </a:rPr>
+              <a:t> </a:t>
+            </a:r>
+            <a:r>
+              <a:rPr lang="en-US" sz="2000" dirty="0">
+                <a:solidFill>
+                  <a:srgbClr val="FF0000"/>
+                </a:solidFill>
+                <a:latin typeface="Consolas" panose="020B0609020204030204" pitchFamily="49" charset="0"/>
+              </a:rPr>
+              <a:t>'E'</a:t>
+            </a:r>
+            <a:r>
+              <a:rPr lang="en-US" sz="2000" dirty="0">
+                <a:solidFill>
+                  <a:srgbClr val="808080"/>
+                </a:solidFill>
+                <a:latin typeface="Consolas" panose="020B0609020204030204" pitchFamily="49" charset="0"/>
+              </a:rPr>
+              <a:t>,</a:t>
+            </a:r>
+            <a:r>
+              <a:rPr lang="en-US" sz="2000" dirty="0">
+                <a:solidFill>
+                  <a:srgbClr val="000000"/>
+                </a:solidFill>
+                <a:latin typeface="Consolas" panose="020B0609020204030204" pitchFamily="49" charset="0"/>
+              </a:rPr>
+              <a:t> </a:t>
+            </a:r>
+            <a:r>
+              <a:rPr lang="en-US" sz="2000" dirty="0">
+                <a:solidFill>
+                  <a:srgbClr val="FF0000"/>
+                </a:solidFill>
+                <a:latin typeface="Consolas" panose="020B0609020204030204" pitchFamily="49" charset="0"/>
+              </a:rPr>
+              <a:t>'A'</a:t>
+            </a:r>
+            <a:r>
+              <a:rPr lang="en-US" sz="2000" dirty="0">
+                <a:solidFill>
+                  <a:srgbClr val="808080"/>
+                </a:solidFill>
+                <a:latin typeface="Consolas" panose="020B0609020204030204" pitchFamily="49" charset="0"/>
+              </a:rPr>
+              <a:t>)</a:t>
+            </a:r>
+            <a:r>
+              <a:rPr lang="en-US" sz="2000" dirty="0">
+                <a:solidFill>
+                  <a:srgbClr val="000000"/>
+                </a:solidFill>
+                <a:latin typeface="Consolas" panose="020B0609020204030204" pitchFamily="49" charset="0"/>
+              </a:rPr>
+              <a:t> </a:t>
+            </a:r>
+          </a:p>
+          <a:p>
+            <a:r>
+              <a:rPr lang="en-US" sz="2000" dirty="0">
+                <a:solidFill>
+                  <a:srgbClr val="000000"/>
+                </a:solidFill>
+                <a:latin typeface="Consolas" panose="020B0609020204030204" pitchFamily="49" charset="0"/>
+              </a:rPr>
+              <a:t>       </a:t>
+            </a:r>
+            <a:r>
+              <a:rPr lang="en-US" sz="2000" dirty="0">
                 <a:solidFill>
                   <a:srgbClr val="0000FF"/>
                 </a:solidFill>
                 <a:latin typeface="Consolas" panose="020B0609020204030204" pitchFamily="49" charset="0"/>
               </a:rPr>
+              <a:t>AS</a:t>
+            </a:r>
+            <a:r>
+              <a:rPr lang="en-US" sz="2000" dirty="0">
+                <a:solidFill>
+                  <a:srgbClr val="000000"/>
+                </a:solidFill>
+                <a:latin typeface="Consolas" panose="020B0609020204030204" pitchFamily="49" charset="0"/>
+              </a:rPr>
+              <a:t> </a:t>
+            </a:r>
+            <a:r>
+              <a:rPr lang="en-US" sz="2000" dirty="0" err="1">
+                <a:solidFill>
+                  <a:srgbClr val="000000"/>
+                </a:solidFill>
+                <a:latin typeface="Consolas" panose="020B0609020204030204" pitchFamily="49" charset="0"/>
+              </a:rPr>
+              <a:t>MyNewText</a:t>
+            </a:r>
+            <a:endParaRPr lang="en-US" sz="2000" dirty="0">
+              <a:solidFill>
+                <a:srgbClr val="000000"/>
+              </a:solidFill>
+              <a:latin typeface="Consolas" panose="020B0609020204030204" pitchFamily="49" charset="0"/>
+            </a:endParaRPr>
+          </a:p>
+          <a:p>
+            <a:r>
+              <a:rPr lang="en-US" sz="2000" dirty="0">
+                <a:solidFill>
+                  <a:srgbClr val="000000"/>
+                </a:solidFill>
+                <a:latin typeface="Consolas" panose="020B0609020204030204" pitchFamily="49" charset="0"/>
+              </a:rPr>
+              <a:t>  </a:t>
+            </a:r>
+            <a:r>
+              <a:rPr lang="en-US" sz="2000" dirty="0">
+                <a:solidFill>
+                  <a:srgbClr val="808080"/>
+                </a:solidFill>
+                <a:latin typeface="Consolas" panose="020B0609020204030204" pitchFamily="49" charset="0"/>
+              </a:rPr>
+              <a:t>,</a:t>
+            </a:r>
+            <a:r>
+              <a:rPr lang="en-US" sz="2000" dirty="0">
+                <a:solidFill>
+                  <a:srgbClr val="000000"/>
+                </a:solidFill>
+                <a:latin typeface="Consolas" panose="020B0609020204030204" pitchFamily="49" charset="0"/>
+              </a:rPr>
+              <a:t> @_mybigtext </a:t>
+            </a:r>
+            <a:r>
+              <a:rPr lang="en-US" sz="2000" dirty="0">
+                <a:solidFill>
+                  <a:srgbClr val="0000FF"/>
+                </a:solidFill>
+                <a:latin typeface="Consolas" panose="020B0609020204030204" pitchFamily="49" charset="0"/>
+              </a:rPr>
+              <a:t>AS</a:t>
+            </a:r>
+            <a:r>
+              <a:rPr lang="en-US" sz="2000" dirty="0">
+                <a:solidFill>
+                  <a:srgbClr val="000000"/>
+                </a:solidFill>
+                <a:latin typeface="Consolas" panose="020B0609020204030204" pitchFamily="49" charset="0"/>
+              </a:rPr>
+              <a:t> </a:t>
+            </a:r>
+            <a:r>
+              <a:rPr lang="en-US" sz="2000" dirty="0" err="1">
+                <a:solidFill>
+                  <a:srgbClr val="000000"/>
+                </a:solidFill>
+                <a:latin typeface="Consolas" panose="020B0609020204030204" pitchFamily="49" charset="0"/>
+              </a:rPr>
+              <a:t>MyBigText</a:t>
+            </a:r>
+            <a:endParaRPr lang="en-US" sz="2000" dirty="0">
+              <a:solidFill>
+                <a:srgbClr val="000000"/>
+              </a:solidFill>
+              <a:latin typeface="Consolas" panose="020B0609020204030204" pitchFamily="49" charset="0"/>
+            </a:endParaRPr>
+          </a:p>
+          <a:p>
+            <a:r>
+              <a:rPr lang="en-US" sz="2000" dirty="0">
+                <a:solidFill>
+                  <a:srgbClr val="000000"/>
+                </a:solidFill>
+                <a:latin typeface="Consolas" panose="020B0609020204030204" pitchFamily="49" charset="0"/>
+              </a:rPr>
+              <a:t>  </a:t>
+            </a:r>
+            <a:r>
+              <a:rPr lang="en-US" sz="2000" dirty="0">
+                <a:solidFill>
+                  <a:srgbClr val="808080"/>
+                </a:solidFill>
+                <a:latin typeface="Consolas" panose="020B0609020204030204" pitchFamily="49" charset="0"/>
+              </a:rPr>
+              <a:t>,</a:t>
+            </a:r>
+            <a:r>
+              <a:rPr lang="en-US" sz="2000" dirty="0">
+                <a:solidFill>
+                  <a:srgbClr val="000000"/>
+                </a:solidFill>
+                <a:latin typeface="Consolas" panose="020B0609020204030204" pitchFamily="49" charset="0"/>
+              </a:rPr>
+              <a:t> </a:t>
+            </a:r>
+            <a:r>
+              <a:rPr lang="en-US" sz="2000" dirty="0">
+                <a:solidFill>
+                  <a:srgbClr val="FF00FF"/>
+                </a:solidFill>
+                <a:latin typeface="Consolas" panose="020B0609020204030204" pitchFamily="49" charset="0"/>
+              </a:rPr>
+              <a:t>TRANSLATE</a:t>
+            </a:r>
+            <a:r>
+              <a:rPr lang="en-US" sz="2000" dirty="0">
+                <a:solidFill>
+                  <a:srgbClr val="808080"/>
+                </a:solidFill>
+                <a:latin typeface="Consolas" panose="020B0609020204030204" pitchFamily="49" charset="0"/>
+              </a:rPr>
+              <a:t>(</a:t>
+            </a:r>
+            <a:r>
+              <a:rPr lang="en-US" sz="2000" dirty="0">
+                <a:solidFill>
+                  <a:srgbClr val="000000"/>
+                </a:solidFill>
+                <a:latin typeface="Consolas" panose="020B0609020204030204" pitchFamily="49" charset="0"/>
+              </a:rPr>
+              <a:t>@_mybigtext</a:t>
+            </a:r>
+            <a:r>
+              <a:rPr lang="en-US" sz="2000" dirty="0">
+                <a:solidFill>
+                  <a:srgbClr val="808080"/>
+                </a:solidFill>
+                <a:latin typeface="Consolas" panose="020B0609020204030204" pitchFamily="49" charset="0"/>
+              </a:rPr>
+              <a:t>,</a:t>
+            </a:r>
+            <a:r>
+              <a:rPr lang="en-US" sz="2000" dirty="0">
+                <a:solidFill>
+                  <a:srgbClr val="000000"/>
+                </a:solidFill>
+                <a:latin typeface="Consolas" panose="020B0609020204030204" pitchFamily="49" charset="0"/>
+              </a:rPr>
+              <a:t> </a:t>
+            </a:r>
+            <a:r>
+              <a:rPr lang="en-US" sz="2000" dirty="0">
+                <a:solidFill>
+                  <a:srgbClr val="FF0000"/>
+                </a:solidFill>
+                <a:latin typeface="Consolas" panose="020B0609020204030204" pitchFamily="49" charset="0"/>
+              </a:rPr>
+              <a:t>'E'</a:t>
+            </a:r>
+            <a:r>
+              <a:rPr lang="en-US" sz="2000" dirty="0">
+                <a:solidFill>
+                  <a:srgbClr val="808080"/>
+                </a:solidFill>
+                <a:latin typeface="Consolas" panose="020B0609020204030204" pitchFamily="49" charset="0"/>
+              </a:rPr>
+              <a:t>,</a:t>
+            </a:r>
+            <a:r>
+              <a:rPr lang="en-US" sz="2000" dirty="0">
+                <a:solidFill>
+                  <a:srgbClr val="000000"/>
+                </a:solidFill>
+                <a:latin typeface="Consolas" panose="020B0609020204030204" pitchFamily="49" charset="0"/>
+              </a:rPr>
+              <a:t> </a:t>
+            </a:r>
+            <a:r>
+              <a:rPr lang="en-US" sz="2000" dirty="0">
+                <a:solidFill>
+                  <a:srgbClr val="FF0000"/>
+                </a:solidFill>
+                <a:latin typeface="Consolas" panose="020B0609020204030204" pitchFamily="49" charset="0"/>
+              </a:rPr>
+              <a:t>'A'</a:t>
+            </a:r>
+            <a:r>
+              <a:rPr lang="en-US" sz="2000" dirty="0">
+                <a:solidFill>
+                  <a:srgbClr val="808080"/>
+                </a:solidFill>
+                <a:latin typeface="Consolas" panose="020B0609020204030204" pitchFamily="49" charset="0"/>
+              </a:rPr>
+              <a:t>)</a:t>
+            </a:r>
+            <a:r>
+              <a:rPr lang="en-US" sz="2000" dirty="0">
+                <a:solidFill>
+                  <a:srgbClr val="000000"/>
+                </a:solidFill>
+                <a:latin typeface="Consolas" panose="020B0609020204030204" pitchFamily="49" charset="0"/>
+              </a:rPr>
+              <a:t> </a:t>
+            </a:r>
+          </a:p>
+          <a:p>
+            <a:r>
+              <a:rPr lang="en-US" sz="2000" dirty="0">
+                <a:solidFill>
+                  <a:srgbClr val="000000"/>
+                </a:solidFill>
+                <a:latin typeface="Consolas" panose="020B0609020204030204" pitchFamily="49" charset="0"/>
+              </a:rPr>
+              <a:t>       </a:t>
+            </a:r>
+            <a:r>
+              <a:rPr lang="en-US" sz="2000" dirty="0">
+                <a:solidFill>
+                  <a:srgbClr val="0000FF"/>
+                </a:solidFill>
+                <a:latin typeface="Consolas" panose="020B0609020204030204" pitchFamily="49" charset="0"/>
+              </a:rPr>
+              <a:t>AS</a:t>
+            </a:r>
+            <a:r>
+              <a:rPr lang="en-US" sz="2000" dirty="0">
+                <a:solidFill>
+                  <a:srgbClr val="000000"/>
+                </a:solidFill>
+                <a:latin typeface="Consolas" panose="020B0609020204030204" pitchFamily="49" charset="0"/>
+              </a:rPr>
+              <a:t> </a:t>
+            </a:r>
+            <a:r>
+              <a:rPr lang="en-US" sz="2000" dirty="0" err="1">
+                <a:solidFill>
+                  <a:srgbClr val="000000"/>
+                </a:solidFill>
+                <a:latin typeface="Consolas" panose="020B0609020204030204" pitchFamily="49" charset="0"/>
+              </a:rPr>
+              <a:t>MyNewBigText</a:t>
+            </a:r>
+            <a:endParaRPr lang="en-US" sz="2000" dirty="0">
+              <a:solidFill>
+                <a:srgbClr val="000000"/>
+              </a:solidFill>
+              <a:latin typeface="Consolas" panose="020B0609020204030204" pitchFamily="49" charset="0"/>
+            </a:endParaRPr>
+          </a:p>
+          <a:p>
+            <a:r>
+              <a:rPr lang="en-US" sz="2000" dirty="0">
+                <a:solidFill>
+                  <a:srgbClr val="0000FF"/>
+                </a:solidFill>
+                <a:latin typeface="Consolas" panose="020B0609020204030204" pitchFamily="49" charset="0"/>
+              </a:rPr>
               <a:t>INTO</a:t>
             </a:r>
             <a:r>
-              <a:rPr lang="en-US" sz="2400" dirty="0">
+              <a:rPr lang="en-US" sz="2000" dirty="0">
                 <a:solidFill>
                   <a:srgbClr val="000000"/>
                 </a:solidFill>
@@ -14932,7 +15354,7 @@
               <a:t> dbo</a:t>
             </a:r>
             <a:r>
-              <a:rPr lang="en-US" sz="2400" dirty="0">
+              <a:rPr lang="en-US" sz="2000" dirty="0">
                 <a:solidFill>
                   <a:srgbClr val="808080"/>
                 </a:solidFill>
@@ -14941,7 +15363,7 @@
               <a:t>.</a:t>
             </a:r>
             <a:r>
-              <a:rPr lang="en-US" sz="2400" dirty="0">
+              <a:rPr lang="en-US" sz="2000" dirty="0">
                 <a:solidFill>
                   <a:srgbClr val="000000"/>
                 </a:solidFill>
@@ -14949,7 +15371,7 @@
               </a:rPr>
               <a:t>Table1</a:t>
             </a:r>
-            <a:endParaRPr lang="en-US" sz="2400" dirty="0"/>
+            <a:endParaRPr lang="en-US" sz="2800" dirty="0"/>
           </a:p>
         </p:txBody>
       </p:sp>
@@ -14988,42 +15410,12 @@
           </a:p>
         </p:txBody>
       </p:sp>
-      <p:pic>
-        <p:nvPicPr>
-          <p:cNvPr id="22" name="Picture 21">
+      <p:grpSp>
+        <p:nvGrpSpPr>
+          <p:cNvPr id="21" name="Group 20">
             <a:extLst>
               <a:ext uri="{FF2B5EF4-FFF2-40B4-BE49-F238E27FC236}">
-                <a16:creationId xmlns:a16="http://schemas.microsoft.com/office/drawing/2014/main" id="{0CA3F68A-CC00-CE9B-E92A-6F48FB11378C}"/>
-              </a:ext>
-            </a:extLst>
-          </p:cNvPr>
-          <p:cNvPicPr>
-            <a:picLocks noChangeAspect="1"/>
-          </p:cNvPicPr>
-          <p:nvPr/>
-        </p:nvPicPr>
-        <p:blipFill>
-          <a:blip r:embed="rId3"/>
-          <a:stretch>
-            <a:fillRect/>
-          </a:stretch>
-        </p:blipFill>
-        <p:spPr>
-          <a:xfrm>
-            <a:off x="7715250" y="991239"/>
-            <a:ext cx="3380942" cy="1957388"/>
-          </a:xfrm>
-          <a:prstGeom prst="rect">
-            <a:avLst/>
-          </a:prstGeom>
-        </p:spPr>
-      </p:pic>
-      <p:grpSp>
-        <p:nvGrpSpPr>
-          <p:cNvPr id="6" name="Group 5">
-            <a:extLst>
-              <a:ext uri="{FF2B5EF4-FFF2-40B4-BE49-F238E27FC236}">
-                <a16:creationId xmlns:a16="http://schemas.microsoft.com/office/drawing/2014/main" id="{C8F22E0E-5243-6436-9E54-101DB9722829}"/>
+                <a16:creationId xmlns:a16="http://schemas.microsoft.com/office/drawing/2014/main" id="{D0E9F364-41B9-91DC-174E-B6C9FF8B2D3E}"/>
               </a:ext>
             </a:extLst>
           </p:cNvPr>
@@ -15032,167 +15424,146 @@
         </p:nvGrpSpPr>
         <p:grpSpPr>
           <a:xfrm>
-            <a:off x="963522" y="3122681"/>
-            <a:ext cx="10264956" cy="2357498"/>
-            <a:chOff x="963522" y="3122681"/>
-            <a:chExt cx="10264956" cy="2357498"/>
+            <a:off x="963522" y="2967563"/>
+            <a:ext cx="10359856" cy="3011518"/>
+            <a:chOff x="963522" y="2967563"/>
+            <a:chExt cx="10359856" cy="3011518"/>
           </a:xfrm>
         </p:grpSpPr>
-        <p:grpSp>
-          <p:nvGrpSpPr>
-            <p:cNvPr id="18" name="Group 17">
+        <p:pic>
+          <p:nvPicPr>
+            <p:cNvPr id="14" name="Picture 13">
               <a:extLst>
                 <a:ext uri="{FF2B5EF4-FFF2-40B4-BE49-F238E27FC236}">
-                  <a16:creationId xmlns:a16="http://schemas.microsoft.com/office/drawing/2014/main" id="{B6075168-B32E-BBBB-C3A2-9BC376CD9D8B}"/>
+                  <a16:creationId xmlns:a16="http://schemas.microsoft.com/office/drawing/2014/main" id="{043F126A-26CD-C59F-0D9E-03E4B6255122}"/>
                 </a:ext>
               </a:extLst>
             </p:cNvPr>
-            <p:cNvGrpSpPr/>
+            <p:cNvPicPr>
+              <a:picLocks noChangeAspect="1"/>
+            </p:cNvPicPr>
             <p:nvPr/>
-          </p:nvGrpSpPr>
-          <p:grpSpPr>
+          </p:nvPicPr>
+          <p:blipFill>
+            <a:blip r:embed="rId3"/>
+            <a:stretch>
+              <a:fillRect/>
+            </a:stretch>
+          </p:blipFill>
+          <p:spPr>
             <a:xfrm>
-              <a:off x="7049190" y="3122681"/>
-              <a:ext cx="4179288" cy="2009389"/>
-              <a:chOff x="7049190" y="3122681"/>
-              <a:chExt cx="4179288" cy="2009389"/>
+              <a:off x="6621722" y="2967563"/>
+              <a:ext cx="4701656" cy="2811463"/>
             </a:xfrm>
-          </p:grpSpPr>
-          <p:pic>
-            <p:nvPicPr>
-              <p:cNvPr id="15" name="Picture 14">
-                <a:extLst>
-                  <a:ext uri="{FF2B5EF4-FFF2-40B4-BE49-F238E27FC236}">
-                    <a16:creationId xmlns:a16="http://schemas.microsoft.com/office/drawing/2014/main" id="{1314EA51-99A6-2CD6-93A6-4DE2E6109446}"/>
-                  </a:ext>
-                </a:extLst>
-              </p:cNvPr>
-              <p:cNvPicPr>
-                <a:picLocks noChangeAspect="1"/>
-              </p:cNvPicPr>
-              <p:nvPr/>
-            </p:nvPicPr>
-            <p:blipFill>
-              <a:blip r:embed="rId4"/>
-              <a:stretch>
-                <a:fillRect/>
-              </a:stretch>
-            </p:blipFill>
-            <p:spPr>
-              <a:xfrm>
-                <a:off x="7049190" y="3122681"/>
-                <a:ext cx="4179288" cy="1957388"/>
-              </a:xfrm>
-              <a:prstGeom prst="rect">
-                <a:avLst/>
-              </a:prstGeom>
-            </p:spPr>
-          </p:pic>
-          <p:sp>
-            <p:nvSpPr>
-              <p:cNvPr id="16" name="Rectangle 15">
-                <a:extLst>
-                  <a:ext uri="{FF2B5EF4-FFF2-40B4-BE49-F238E27FC236}">
-                    <a16:creationId xmlns:a16="http://schemas.microsoft.com/office/drawing/2014/main" id="{09F51898-0056-0438-0AA3-4901FFF1029C}"/>
-                  </a:ext>
-                </a:extLst>
-              </p:cNvPr>
-              <p:cNvSpPr/>
-              <p:nvPr/>
-            </p:nvSpPr>
-            <p:spPr>
-              <a:xfrm>
-                <a:off x="7715250" y="4080510"/>
-                <a:ext cx="3371850" cy="400110"/>
-              </a:xfrm>
-              <a:prstGeom prst="rect">
-                <a:avLst/>
-              </a:prstGeom>
-              <a:noFill/>
-              <a:ln w="50800">
-                <a:solidFill>
-                  <a:srgbClr val="FF0000"/>
-                </a:solidFill>
-              </a:ln>
-            </p:spPr>
-            <p:style>
-              <a:lnRef idx="2">
-                <a:schemeClr val="accent1">
-                  <a:shade val="15000"/>
-                </a:schemeClr>
-              </a:lnRef>
-              <a:fillRef idx="1">
-                <a:schemeClr val="accent1"/>
-              </a:fillRef>
-              <a:effectRef idx="0">
-                <a:schemeClr val="accent1"/>
-              </a:effectRef>
-              <a:fontRef idx="minor">
-                <a:schemeClr val="lt1"/>
-              </a:fontRef>
-            </p:style>
-            <p:txBody>
-              <a:bodyPr rtlCol="0" anchor="ctr"/>
-              <a:lstStyle/>
-              <a:p>
-                <a:pPr algn="ctr"/>
-                <a:endParaRPr lang="en-US"/>
-              </a:p>
-            </p:txBody>
-          </p:sp>
-          <p:sp>
-            <p:nvSpPr>
-              <p:cNvPr id="17" name="Rectangle 16">
-                <a:extLst>
-                  <a:ext uri="{FF2B5EF4-FFF2-40B4-BE49-F238E27FC236}">
-                    <a16:creationId xmlns:a16="http://schemas.microsoft.com/office/drawing/2014/main" id="{ACC9B985-240D-9F99-08B7-E36E00DEA90A}"/>
-                  </a:ext>
-                </a:extLst>
-              </p:cNvPr>
-              <p:cNvSpPr/>
-              <p:nvPr/>
-            </p:nvSpPr>
-            <p:spPr>
-              <a:xfrm>
-                <a:off x="7715250" y="4731960"/>
-                <a:ext cx="3513228" cy="400110"/>
-              </a:xfrm>
-              <a:prstGeom prst="rect">
-                <a:avLst/>
-              </a:prstGeom>
-              <a:noFill/>
-              <a:ln w="50800">
-                <a:solidFill>
-                  <a:srgbClr val="FF0000"/>
-                </a:solidFill>
-              </a:ln>
-            </p:spPr>
-            <p:style>
-              <a:lnRef idx="2">
-                <a:schemeClr val="accent1">
-                  <a:shade val="15000"/>
-                </a:schemeClr>
-              </a:lnRef>
-              <a:fillRef idx="1">
-                <a:schemeClr val="accent1"/>
-              </a:fillRef>
-              <a:effectRef idx="0">
-                <a:schemeClr val="accent1"/>
-              </a:effectRef>
-              <a:fontRef idx="minor">
-                <a:schemeClr val="lt1"/>
-              </a:fontRef>
-            </p:style>
-            <p:txBody>
-              <a:bodyPr rtlCol="0" anchor="ctr"/>
-              <a:lstStyle/>
-              <a:p>
-                <a:pPr algn="ctr"/>
-                <a:endParaRPr lang="en-US"/>
-              </a:p>
-            </p:txBody>
-          </p:sp>
-        </p:grpSp>
+            <a:prstGeom prst="rect">
+              <a:avLst/>
+            </a:prstGeom>
+          </p:spPr>
+        </p:pic>
+        <p:sp>
+          <p:nvSpPr>
+            <p:cNvPr id="16" name="Rectangle 15">
+              <a:extLst>
+                <a:ext uri="{FF2B5EF4-FFF2-40B4-BE49-F238E27FC236}">
+                  <a16:creationId xmlns:a16="http://schemas.microsoft.com/office/drawing/2014/main" id="{09F51898-0056-0438-0AA3-4901FFF1029C}"/>
+                </a:ext>
+              </a:extLst>
+            </p:cNvPr>
+            <p:cNvSpPr/>
+            <p:nvPr/>
+          </p:nvSpPr>
+          <p:spPr>
+            <a:xfrm>
+              <a:off x="7557339" y="3993296"/>
+              <a:ext cx="3371850" cy="400110"/>
+            </a:xfrm>
+            <a:prstGeom prst="rect">
+              <a:avLst/>
+            </a:prstGeom>
+            <a:noFill/>
+            <a:ln w="50800">
+              <a:solidFill>
+                <a:srgbClr val="FF0000"/>
+              </a:solidFill>
+            </a:ln>
+          </p:spPr>
+          <p:style>
+            <a:lnRef idx="2">
+              <a:schemeClr val="accent1">
+                <a:shade val="15000"/>
+              </a:schemeClr>
+            </a:lnRef>
+            <a:fillRef idx="1">
+              <a:schemeClr val="accent1"/>
+            </a:fillRef>
+            <a:effectRef idx="0">
+              <a:schemeClr val="accent1"/>
+            </a:effectRef>
+            <a:fontRef idx="minor">
+              <a:schemeClr val="lt1"/>
+            </a:fontRef>
+          </p:style>
+          <p:txBody>
+            <a:bodyPr rtlCol="0" anchor="ctr"/>
+            <a:lstStyle/>
+            <a:p>
+              <a:pPr algn="ctr"/>
+              <a:endParaRPr lang="en-US"/>
+            </a:p>
+          </p:txBody>
+        </p:sp>
+        <p:sp>
+          <p:nvSpPr>
+            <p:cNvPr id="17" name="Rectangle 16">
+              <a:extLst>
+                <a:ext uri="{FF2B5EF4-FFF2-40B4-BE49-F238E27FC236}">
+                  <a16:creationId xmlns:a16="http://schemas.microsoft.com/office/drawing/2014/main" id="{ACC9B985-240D-9F99-08B7-E36E00DEA90A}"/>
+                </a:ext>
+              </a:extLst>
+            </p:cNvPr>
+            <p:cNvSpPr/>
+            <p:nvPr/>
+          </p:nvSpPr>
+          <p:spPr>
+            <a:xfrm>
+              <a:off x="7529603" y="4686106"/>
+              <a:ext cx="3513228" cy="400110"/>
+            </a:xfrm>
+            <a:prstGeom prst="rect">
+              <a:avLst/>
+            </a:prstGeom>
+            <a:noFill/>
+            <a:ln w="50800">
+              <a:solidFill>
+                <a:srgbClr val="FF0000"/>
+              </a:solidFill>
+            </a:ln>
+          </p:spPr>
+          <p:style>
+            <a:lnRef idx="2">
+              <a:schemeClr val="accent1">
+                <a:shade val="15000"/>
+              </a:schemeClr>
+            </a:lnRef>
+            <a:fillRef idx="1">
+              <a:schemeClr val="accent1"/>
+            </a:fillRef>
+            <a:effectRef idx="0">
+              <a:schemeClr val="accent1"/>
+            </a:effectRef>
+            <a:fontRef idx="minor">
+              <a:schemeClr val="lt1"/>
+            </a:fontRef>
+          </p:style>
+          <p:txBody>
+            <a:bodyPr rtlCol="0" anchor="ctr"/>
+            <a:lstStyle/>
+            <a:p>
+              <a:pPr algn="ctr"/>
+              <a:endParaRPr lang="en-US"/>
+            </a:p>
+          </p:txBody>
+        </p:sp>
         <p:sp>
           <p:nvSpPr>
             <p:cNvPr id="3" name="Rectangle 2">
@@ -15207,7 +15578,7 @@
           </p:nvSpPr>
           <p:spPr>
             <a:xfrm>
-              <a:off x="963522" y="5080069"/>
+              <a:off x="963522" y="5578971"/>
               <a:ext cx="2795678" cy="400110"/>
             </a:xfrm>
             <a:prstGeom prst="rect">
@@ -15255,14 +15626,15 @@
               </a:extLst>
             </p:cNvPr>
             <p:cNvCxnSpPr>
+              <a:cxnSpLocks/>
               <a:stCxn id="3" idx="3"/>
             </p:cNvCxnSpPr>
             <p:nvPr/>
           </p:nvCxnSpPr>
           <p:spPr>
             <a:xfrm flipV="1">
-              <a:off x="3759200" y="4731960"/>
-              <a:ext cx="3556000" cy="548164"/>
+              <a:off x="3759200" y="4559300"/>
+              <a:ext cx="3492500" cy="1219726"/>
             </a:xfrm>
             <a:prstGeom prst="straightConnector1">
               <a:avLst/>
@@ -15289,6 +15661,58 @@
             </a:fontRef>
           </p:style>
         </p:cxnSp>
+        <p:sp>
+          <p:nvSpPr>
+            <p:cNvPr id="20" name="Rectangle 19">
+              <a:extLst>
+                <a:ext uri="{FF2B5EF4-FFF2-40B4-BE49-F238E27FC236}">
+                  <a16:creationId xmlns:a16="http://schemas.microsoft.com/office/drawing/2014/main" id="{8BE6E3BE-ABDD-F27C-C2A5-E77B845CDD87}"/>
+                </a:ext>
+              </a:extLst>
+            </p:cNvPr>
+            <p:cNvSpPr/>
+            <p:nvPr/>
+          </p:nvSpPr>
+          <p:spPr>
+            <a:xfrm>
+              <a:off x="7557338" y="5378916"/>
+              <a:ext cx="3766039" cy="400110"/>
+            </a:xfrm>
+            <a:prstGeom prst="rect">
+              <a:avLst/>
+            </a:prstGeom>
+            <a:noFill/>
+            <a:ln w="50800">
+              <a:solidFill>
+                <a:srgbClr val="FF0000"/>
+              </a:solidFill>
+            </a:ln>
+          </p:spPr>
+          <p:style>
+            <a:lnRef idx="2">
+              <a:schemeClr val="accent1">
+                <a:shade val="15000"/>
+              </a:schemeClr>
+            </a:lnRef>
+            <a:fillRef idx="1">
+              <a:schemeClr val="accent1"/>
+            </a:fillRef>
+            <a:effectRef idx="0">
+              <a:schemeClr val="accent1"/>
+            </a:effectRef>
+            <a:fontRef idx="minor">
+              <a:schemeClr val="lt1"/>
+            </a:fontRef>
+          </p:style>
+          <p:txBody>
+            <a:bodyPr rtlCol="0" anchor="ctr"/>
+            <a:lstStyle/>
+            <a:p>
+              <a:pPr algn="ctr"/>
+              <a:endParaRPr lang="en-US"/>
+            </a:p>
+          </p:txBody>
+        </p:sp>
       </p:grpSp>
     </p:spTree>
     <p:extLst>
@@ -15334,52 +15758,7 @@
                                           </p:stCondLst>
                                         </p:cTn>
                                         <p:tgtEl>
-                                          <p:spTgt spid="6"/>
-                                        </p:tgtEl>
-                                        <p:attrNameLst>
-                                          <p:attrName>style.visibility</p:attrName>
-                                        </p:attrNameLst>
-                                      </p:cBhvr>
-                                      <p:to>
-                                        <p:strVal val="visible"/>
-                                      </p:to>
-                                    </p:set>
-                                  </p:childTnLst>
-                                </p:cTn>
-                              </p:par>
-                            </p:childTnLst>
-                          </p:cTn>
-                        </p:par>
-                      </p:childTnLst>
-                    </p:cTn>
-                  </p:par>
-                  <p:par>
-                    <p:cTn id="7" fill="hold">
-                      <p:stCondLst>
-                        <p:cond delay="indefinite"/>
-                      </p:stCondLst>
-                      <p:childTnLst>
-                        <p:par>
-                          <p:cTn id="8" fill="hold">
-                            <p:stCondLst>
-                              <p:cond delay="0"/>
-                            </p:stCondLst>
-                            <p:childTnLst>
-                              <p:par>
-                                <p:cTn id="9" presetID="1" presetClass="entr" presetSubtype="0" fill="hold" nodeType="clickEffect">
-                                  <p:stCondLst>
-                                    <p:cond delay="0"/>
-                                  </p:stCondLst>
-                                  <p:childTnLst>
-                                    <p:set>
-                                      <p:cBhvr>
-                                        <p:cTn id="10" dur="1" fill="hold">
-                                          <p:stCondLst>
-                                            <p:cond delay="0"/>
-                                          </p:stCondLst>
-                                        </p:cTn>
-                                        <p:tgtEl>
-                                          <p:spTgt spid="22"/>
+                                          <p:spTgt spid="21"/>
                                         </p:tgtEl>
                                         <p:attrNameLst>
                                           <p:attrName>style.visibility</p:attrName>
@@ -16575,7 +16954,7 @@
             </a:r>
             <a:r>
               <a:rPr lang="en-US" sz="2400" dirty="0"/>
-              <a:t> casts the resulting value into a varchar(8000), potentially </a:t>
+              <a:t> can cast the resulting value into a larger datatype, potentially </a:t>
             </a:r>
           </a:p>
           <a:p>

</xml_diff>